<commit_message>
topic 7 zip link fixed
</commit_message>
<xml_diff>
--- a/topic07/talk-2/a-css-layout-part2.pptx
+++ b/topic07/talk-2/a-css-layout-part2.pptx
@@ -4754,7 +4754,7 @@
           </a:ln>
           <a:extLst>
             <a:ext uri="{C572A759-6A51-4108-AA02-DFA0A04FC94B}">
-              <ma14:wrappingTextBoxFlag xmlns="" xmlns:ma14="http://schemas.microsoft.com/office/mac/drawingml/2011/main" val="1"/>
+              <ma14:wrappingTextBoxFlag xmlns:ma14="http://schemas.microsoft.com/office/mac/drawingml/2011/main" xmlns="" val="1"/>
             </a:ext>
           </a:extLst>
         </p:spPr>
@@ -4793,7 +4793,7 @@
           </a:ln>
           <a:extLst>
             <a:ext uri="{C572A759-6A51-4108-AA02-DFA0A04FC94B}">
-              <ma14:wrappingTextBoxFlag xmlns="" xmlns:ma14="http://schemas.microsoft.com/office/mac/drawingml/2011/main" val="1"/>
+              <ma14:wrappingTextBoxFlag xmlns:ma14="http://schemas.microsoft.com/office/mac/drawingml/2011/main" xmlns="" val="1"/>
             </a:ext>
           </a:extLst>
         </p:spPr>
@@ -8587,13 +8587,6 @@
               </a:rPr>
               <a:t>flexbox</a:t>
             </a:r>
-            <a:endParaRPr lang="en-IE" dirty="0">
-              <a:solidFill>
-                <a:schemeClr val="tx2">
-                  <a:satMod val="130000"/>
-                </a:schemeClr>
-              </a:solidFill>
-            </a:endParaRPr>
           </a:p>
         </p:txBody>
       </p:sp>
@@ -8823,7 +8816,7 @@
           </a:prstGeom>
           <a:extLst>
             <a:ext uri="{C572A759-6A51-4108-AA02-DFA0A04FC94B}">
-              <ma14:wrappingTextBoxFlag xmlns="" xmlns:ma14="http://schemas.microsoft.com/office/mac/drawingml/2011/main" val="1"/>
+              <ma14:wrappingTextBoxFlag xmlns:ma14="http://schemas.microsoft.com/office/mac/drawingml/2011/main" xmlns="" val="1"/>
             </a:ext>
           </a:extLst>
         </p:spPr>
@@ -9653,7 +9646,7 @@
             <a:effectLst/>
             <a:extLst>
               <a:ext uri="{C572A759-6A51-4108-AA02-DFA0A04FC94B}">
-                <ma14:wrappingTextBoxFlag xmlns="" xmlns:ma14="http://schemas.microsoft.com/office/mac/drawingml/2011/main" val="1"/>
+                <ma14:wrappingTextBoxFlag xmlns:ma14="http://schemas.microsoft.com/office/mac/drawingml/2011/main" xmlns="" val="1"/>
               </a:ext>
             </a:extLst>
           </p:spPr>
@@ -10127,7 +10120,7 @@
           </a:ln>
           <a:extLst>
             <a:ext uri="{C572A759-6A51-4108-AA02-DFA0A04FC94B}">
-              <ma14:wrappingTextBoxFlag xmlns="" xmlns:ma14="http://schemas.microsoft.com/office/mac/drawingml/2011/main" val="1"/>
+              <ma14:wrappingTextBoxFlag xmlns:ma14="http://schemas.microsoft.com/office/mac/drawingml/2011/main" xmlns="" val="1"/>
             </a:ext>
           </a:extLst>
         </p:spPr>

</xml_diff>